<commit_message>
whoops, uploaded wrong version last time
</commit_message>
<xml_diff>
--- a/Project Luther/Project Luther.pptx
+++ b/Project Luther/Project Luther.pptx
@@ -1026,7 +1026,7 @@
       </p:grpSpPr>
       <p:sp>
         <p:nvSpPr>
-          <p:cNvPr id="264" name="Google Shape;264;g4459ab2c24_1_1602:notes"/>
+          <p:cNvPr id="264" name="Google Shape;264;gc6f9e470d_0_47:notes"/>
           <p:cNvSpPr/>
           <p:nvPr>
             <p:ph idx="2" type="sldImg"/>
@@ -1034,8 +1034,8 @@
         </p:nvSpPr>
         <p:spPr>
           <a:xfrm>
-            <a:off x="381300" y="685800"/>
-            <a:ext cx="6096000" cy="3429000"/>
+            <a:off x="381188" y="685800"/>
+            <a:ext cx="6096300" cy="3429000"/>
           </a:xfrm>
           <a:custGeom>
             <a:rect b="b" l="l" r="r" t="t"/>
@@ -1061,7 +1061,7 @@
       </p:sp>
       <p:sp>
         <p:nvSpPr>
-          <p:cNvPr id="265" name="Google Shape;265;g4459ab2c24_1_1602:notes"/>
+          <p:cNvPr id="265" name="Google Shape;265;gc6f9e470d_0_47:notes"/>
           <p:cNvSpPr txBox="1"/>
           <p:nvPr>
             <p:ph idx="1" type="body"/>
@@ -1111,7 +1111,7 @@
   <p:cSld>
     <p:spTree>
       <p:nvGrpSpPr>
-        <p:cNvPr id="272" name="Shape 272"/>
+        <p:cNvPr id="299" name="Shape 299"/>
         <p:cNvGrpSpPr/>
         <p:nvPr/>
       </p:nvGrpSpPr>
@@ -1125,7 +1125,7 @@
       </p:grpSpPr>
       <p:sp>
         <p:nvSpPr>
-          <p:cNvPr id="273" name="Google Shape;273;gc6f9e470d_0_47:notes"/>
+          <p:cNvPr id="300" name="Google Shape;300;g4459ab2c24_1_1602:notes"/>
           <p:cNvSpPr/>
           <p:nvPr>
             <p:ph idx="2" type="sldImg"/>
@@ -1133,8 +1133,8 @@
         </p:nvSpPr>
         <p:spPr>
           <a:xfrm>
-            <a:off x="381188" y="685800"/>
-            <a:ext cx="6096300" cy="3429000"/>
+            <a:off x="381300" y="685800"/>
+            <a:ext cx="6096000" cy="3429000"/>
           </a:xfrm>
           <a:custGeom>
             <a:rect b="b" l="l" r="r" t="t"/>
@@ -1160,7 +1160,7 @@
       </p:sp>
       <p:sp>
         <p:nvSpPr>
-          <p:cNvPr id="274" name="Google Shape;274;gc6f9e470d_0_47:notes"/>
+          <p:cNvPr id="301" name="Google Shape;301;g4459ab2c24_1_1602:notes"/>
           <p:cNvSpPr txBox="1"/>
           <p:nvPr>
             <p:ph idx="1" type="body"/>
@@ -1210,7 +1210,7 @@
   <p:cSld>
     <p:spTree>
       <p:nvGrpSpPr>
-        <p:cNvPr id="308" name="Shape 308"/>
+        <p:cNvPr id="309" name="Shape 309"/>
         <p:cNvGrpSpPr/>
         <p:nvPr/>
       </p:nvGrpSpPr>
@@ -1224,7 +1224,7 @@
       </p:grpSpPr>
       <p:sp>
         <p:nvSpPr>
-          <p:cNvPr id="309" name="Google Shape;309;g4459ab2c24_1_1616:notes"/>
+          <p:cNvPr id="310" name="Google Shape;310;g4459ab2c24_1_1616:notes"/>
           <p:cNvSpPr/>
           <p:nvPr>
             <p:ph idx="2" type="sldImg"/>
@@ -1259,7 +1259,7 @@
       </p:sp>
       <p:sp>
         <p:nvSpPr>
-          <p:cNvPr id="310" name="Google Shape;310;g4459ab2c24_1_1616:notes"/>
+          <p:cNvPr id="311" name="Google Shape;311;g4459ab2c24_1_1616:notes"/>
           <p:cNvSpPr txBox="1"/>
           <p:nvPr>
             <p:ph idx="1" type="body"/>
@@ -1309,7 +1309,7 @@
   <p:cSld>
     <p:spTree>
       <p:nvGrpSpPr>
-        <p:cNvPr id="314" name="Shape 314"/>
+        <p:cNvPr id="315" name="Shape 315"/>
         <p:cNvGrpSpPr/>
         <p:nvPr/>
       </p:nvGrpSpPr>
@@ -1323,7 +1323,7 @@
       </p:grpSpPr>
       <p:sp>
         <p:nvSpPr>
-          <p:cNvPr id="315" name="Google Shape;315;gc6f9e470d_0_126:notes"/>
+          <p:cNvPr id="316" name="Google Shape;316;gc6f9e470d_0_126:notes"/>
           <p:cNvSpPr/>
           <p:nvPr>
             <p:ph idx="2" type="sldImg"/>
@@ -1358,7 +1358,7 @@
       </p:sp>
       <p:sp>
         <p:nvSpPr>
-          <p:cNvPr id="316" name="Google Shape;316;gc6f9e470d_0_126:notes"/>
+          <p:cNvPr id="317" name="Google Shape;317;gc6f9e470d_0_126:notes"/>
           <p:cNvSpPr txBox="1"/>
           <p:nvPr>
             <p:ph idx="1" type="body"/>
@@ -1408,7 +1408,7 @@
   <p:cSld>
     <p:spTree>
       <p:nvGrpSpPr>
-        <p:cNvPr id="321" name="Shape 321"/>
+        <p:cNvPr id="322" name="Shape 322"/>
         <p:cNvGrpSpPr/>
         <p:nvPr/>
       </p:nvGrpSpPr>
@@ -1422,7 +1422,7 @@
       </p:grpSpPr>
       <p:sp>
         <p:nvSpPr>
-          <p:cNvPr id="322" name="Google Shape;322;g4459ab2c24_3_10:notes"/>
+          <p:cNvPr id="323" name="Google Shape;323;g4459ab2c24_3_10:notes"/>
           <p:cNvSpPr/>
           <p:nvPr>
             <p:ph idx="2" type="sldImg"/>
@@ -1457,7 +1457,7 @@
       </p:sp>
       <p:sp>
         <p:nvSpPr>
-          <p:cNvPr id="323" name="Google Shape;323;g4459ab2c24_3_10:notes"/>
+          <p:cNvPr id="324" name="Google Shape;324;g4459ab2c24_3_10:notes"/>
           <p:cNvSpPr txBox="1"/>
           <p:nvPr>
             <p:ph idx="1" type="body"/>
@@ -1507,7 +1507,7 @@
   <p:cSld>
     <p:spTree>
       <p:nvGrpSpPr>
-        <p:cNvPr id="329" name="Shape 329"/>
+        <p:cNvPr id="330" name="Shape 330"/>
         <p:cNvGrpSpPr/>
         <p:nvPr/>
       </p:nvGrpSpPr>
@@ -1521,7 +1521,7 @@
       </p:grpSpPr>
       <p:sp>
         <p:nvSpPr>
-          <p:cNvPr id="330" name="Google Shape;330;g4459ab2c24_3_3:notes"/>
+          <p:cNvPr id="331" name="Google Shape;331;g4459ab2c24_3_3:notes"/>
           <p:cNvSpPr/>
           <p:nvPr>
             <p:ph idx="2" type="sldImg"/>
@@ -1556,7 +1556,7 @@
       </p:sp>
       <p:sp>
         <p:nvSpPr>
-          <p:cNvPr id="331" name="Google Shape;331;g4459ab2c24_3_3:notes"/>
+          <p:cNvPr id="332" name="Google Shape;332;g4459ab2c24_3_3:notes"/>
           <p:cNvSpPr txBox="1"/>
           <p:nvPr>
             <p:ph idx="1" type="body"/>
@@ -1606,7 +1606,7 @@
   <p:cSld>
     <p:spTree>
       <p:nvGrpSpPr>
-        <p:cNvPr id="335" name="Shape 335"/>
+        <p:cNvPr id="336" name="Shape 336"/>
         <p:cNvGrpSpPr/>
         <p:nvPr/>
       </p:nvGrpSpPr>
@@ -1620,7 +1620,7 @@
       </p:grpSpPr>
       <p:sp>
         <p:nvSpPr>
-          <p:cNvPr id="336" name="Google Shape;336;g4459ab2c24_1_31:notes"/>
+          <p:cNvPr id="337" name="Google Shape;337;g4459ab2c24_1_31:notes"/>
           <p:cNvSpPr/>
           <p:nvPr>
             <p:ph idx="2" type="sldImg"/>
@@ -1655,7 +1655,7 @@
       </p:sp>
       <p:sp>
         <p:nvSpPr>
-          <p:cNvPr id="337" name="Google Shape;337;g4459ab2c24_1_31:notes"/>
+          <p:cNvPr id="338" name="Google Shape;338;g4459ab2c24_1_31:notes"/>
           <p:cNvSpPr txBox="1"/>
           <p:nvPr>
             <p:ph idx="1" type="body"/>
@@ -11188,239 +11188,7 @@
       </p:grpSpPr>
       <p:sp>
         <p:nvSpPr>
-          <p:cNvPr id="267" name="Google Shape;267;p24"/>
-          <p:cNvSpPr/>
-          <p:nvPr/>
-        </p:nvSpPr>
-        <p:spPr>
-          <a:xfrm>
-            <a:off x="-100" y="1021875"/>
-            <a:ext cx="9144000" cy="4121700"/>
-          </a:xfrm>
-          <a:prstGeom prst="rect">
-            <a:avLst/>
-          </a:prstGeom>
-          <a:gradFill>
-            <a:gsLst>
-              <a:gs pos="0">
-                <a:srgbClr val="A8B8DF"/>
-              </a:gs>
-              <a:gs pos="100000">
-                <a:srgbClr val="516DB4"/>
-              </a:gs>
-            </a:gsLst>
-            <a:lin ang="5400012" scaled="0"/>
-          </a:gradFill>
-          <a:ln cap="flat" cmpd="sng" w="9525">
-            <a:solidFill>
-              <a:schemeClr val="dk2"/>
-            </a:solidFill>
-            <a:prstDash val="solid"/>
-            <a:round/>
-            <a:headEnd len="sm" w="sm" type="none"/>
-            <a:tailEnd len="sm" w="sm" type="none"/>
-          </a:ln>
-        </p:spPr>
-        <p:txBody>
-          <a:bodyPr anchorCtr="0" anchor="ctr" bIns="91425" lIns="91425" spcFirstLastPara="1" rIns="91425" wrap="square" tIns="91425">
-            <a:noAutofit/>
-          </a:bodyPr>
-          <a:lstStyle/>
-          <a:p>
-            <a:pPr indent="0" lvl="0" marL="0" rtl="0" algn="l">
-              <a:spcBef>
-                <a:spcPts val="0"/>
-              </a:spcBef>
-              <a:spcAft>
-                <a:spcPts val="0"/>
-              </a:spcAft>
-              <a:buNone/>
-            </a:pPr>
-            <a:r>
-              <a:t/>
-            </a:r>
-            <a:endParaRPr/>
-          </a:p>
-        </p:txBody>
-      </p:sp>
-      <p:sp>
-        <p:nvSpPr>
-          <p:cNvPr id="268" name="Google Shape;268;p24"/>
-          <p:cNvSpPr txBox="1"/>
-          <p:nvPr>
-            <p:ph type="title"/>
-          </p:nvPr>
-        </p:nvSpPr>
-        <p:spPr>
-          <a:xfrm>
-            <a:off x="311700" y="181400"/>
-            <a:ext cx="8520600" cy="607800"/>
-          </a:xfrm>
-          <a:prstGeom prst="rect">
-            <a:avLst/>
-          </a:prstGeom>
-        </p:spPr>
-        <p:txBody>
-          <a:bodyPr anchorCtr="0" anchor="t" bIns="91425" lIns="91425" spcFirstLastPara="1" rIns="91425" wrap="square" tIns="91425">
-            <a:noAutofit/>
-          </a:bodyPr>
-          <a:lstStyle/>
-          <a:p>
-            <a:pPr indent="0" lvl="0" marL="0" rtl="0" algn="l">
-              <a:spcBef>
-                <a:spcPts val="0"/>
-              </a:spcBef>
-              <a:spcAft>
-                <a:spcPts val="0"/>
-              </a:spcAft>
-              <a:buNone/>
-            </a:pPr>
-            <a:r>
-              <a:rPr lang="en"/>
-              <a:t>Linear Regression: Ridge Regression</a:t>
-            </a:r>
-            <a:endParaRPr/>
-          </a:p>
-        </p:txBody>
-      </p:sp>
-      <p:pic>
-        <p:nvPicPr>
-          <p:cNvPr id="269" name="Google Shape;269;p24"/>
-          <p:cNvPicPr preferRelativeResize="0"/>
-          <p:nvPr/>
-        </p:nvPicPr>
-        <p:blipFill>
-          <a:blip r:embed="rId3">
-            <a:alphaModFix/>
-          </a:blip>
-          <a:stretch>
-            <a:fillRect/>
-          </a:stretch>
-        </p:blipFill>
-        <p:spPr>
-          <a:xfrm>
-            <a:off x="5620775" y="1390950"/>
-            <a:ext cx="2853125" cy="2961050"/>
-          </a:xfrm>
-          <a:prstGeom prst="rect">
-            <a:avLst/>
-          </a:prstGeom>
-          <a:noFill/>
-          <a:ln>
-            <a:noFill/>
-          </a:ln>
-        </p:spPr>
-      </p:pic>
-      <p:pic>
-        <p:nvPicPr>
-          <p:cNvPr id="270" name="Google Shape;270;p24"/>
-          <p:cNvPicPr preferRelativeResize="0"/>
-          <p:nvPr/>
-        </p:nvPicPr>
-        <p:blipFill>
-          <a:blip r:embed="rId4">
-            <a:alphaModFix/>
-          </a:blip>
-          <a:stretch>
-            <a:fillRect/>
-          </a:stretch>
-        </p:blipFill>
-        <p:spPr>
-          <a:xfrm>
-            <a:off x="1048039" y="1390950"/>
-            <a:ext cx="2349586" cy="2961048"/>
-          </a:xfrm>
-          <a:prstGeom prst="rect">
-            <a:avLst/>
-          </a:prstGeom>
-          <a:noFill/>
-          <a:ln>
-            <a:noFill/>
-          </a:ln>
-        </p:spPr>
-      </p:pic>
-      <p:sp>
-        <p:nvSpPr>
-          <p:cNvPr id="271" name="Google Shape;271;p24"/>
-          <p:cNvSpPr txBox="1"/>
-          <p:nvPr/>
-        </p:nvSpPr>
-        <p:spPr>
-          <a:xfrm>
-            <a:off x="3805350" y="1390950"/>
-            <a:ext cx="1380900" cy="1028400"/>
-          </a:xfrm>
-          <a:prstGeom prst="rect">
-            <a:avLst/>
-          </a:prstGeom>
-          <a:noFill/>
-          <a:ln>
-            <a:noFill/>
-          </a:ln>
-        </p:spPr>
-        <p:txBody>
-          <a:bodyPr anchorCtr="0" anchor="t" bIns="91425" lIns="91425" spcFirstLastPara="1" rIns="91425" wrap="square" tIns="91425">
-            <a:noAutofit/>
-          </a:bodyPr>
-          <a:lstStyle/>
-          <a:p>
-            <a:pPr indent="0" lvl="0" marL="0" rtl="0" algn="ctr">
-              <a:spcBef>
-                <a:spcPts val="0"/>
-              </a:spcBef>
-              <a:spcAft>
-                <a:spcPts val="0"/>
-              </a:spcAft>
-              <a:buNone/>
-            </a:pPr>
-            <a:r>
-              <a:rPr lang="en" sz="3000" u="sng"/>
-              <a:t>Goal</a:t>
-            </a:r>
-            <a:r>
-              <a:rPr lang="en" sz="3000"/>
-              <a:t>: </a:t>
-            </a:r>
-            <a:r>
-              <a:rPr lang="en" sz="1800"/>
-              <a:t>M</a:t>
-            </a:r>
-            <a:r>
-              <a:rPr lang="en" sz="1800"/>
-              <a:t>inimize errors (SSE) and maximize predictive power</a:t>
-            </a:r>
-            <a:endParaRPr sz="1800"/>
-          </a:p>
-        </p:txBody>
-      </p:sp>
-    </p:spTree>
-  </p:cSld>
-  <p:clrMapOvr>
-    <a:masterClrMapping/>
-  </p:clrMapOvr>
-</p:sld>
-</file>
-
-<file path=ppt/slides/slide13.xml><?xml version="1.0" encoding="utf-8"?>
-<p:sld xmlns:a="http://schemas.openxmlformats.org/drawingml/2006/main" xmlns:r="http://schemas.openxmlformats.org/officeDocument/2006/relationships" xmlns:mc="http://schemas.openxmlformats.org/markup-compatibility/2006" xmlns:mv="urn:schemas-microsoft-com:mac:vml" xmlns:p="http://schemas.openxmlformats.org/presentationml/2006/main" xmlns:c="http://schemas.openxmlformats.org/drawingml/2006/chart" xmlns:dgm="http://schemas.openxmlformats.org/drawingml/2006/diagram" xmlns:o="urn:schemas-microsoft-com:office:office" xmlns:v="urn:schemas-microsoft-com:vml" xmlns:pvml="urn:schemas-microsoft-com:office:powerpoint" xmlns:com="http://schemas.openxmlformats.org/drawingml/2006/compatibility" xmlns:p14="http://schemas.microsoft.com/office/powerpoint/2010/main" xmlns:p15="http://schemas.microsoft.com/office/powerpoint/2012/main">
-  <p:cSld>
-    <p:spTree>
-      <p:nvGrpSpPr>
-        <p:cNvPr id="275" name="Shape 275"/>
-        <p:cNvGrpSpPr/>
-        <p:nvPr/>
-      </p:nvGrpSpPr>
-      <p:grpSpPr>
-        <a:xfrm>
-          <a:off x="0" y="0"/>
-          <a:ext cx="0" cy="0"/>
-          <a:chOff x="0" y="0"/>
-          <a:chExt cx="0" cy="0"/>
-        </a:xfrm>
-      </p:grpSpPr>
-      <p:sp>
-        <p:nvSpPr>
-          <p:cNvPr descr="Background pointer shape in timeline graphic" id="276" name="Google Shape;276;p25"/>
+          <p:cNvPr descr="Background pointer shape in timeline graphic" id="267" name="Google Shape;267;p24"/>
           <p:cNvSpPr/>
           <p:nvPr/>
         </p:nvSpPr>
@@ -11471,7 +11239,7 @@
       </p:sp>
       <p:sp>
         <p:nvSpPr>
-          <p:cNvPr id="277" name="Google Shape;277;p25"/>
+          <p:cNvPr id="268" name="Google Shape;268;p24"/>
           <p:cNvSpPr txBox="1"/>
           <p:nvPr>
             <p:ph idx="4294967295" type="body"/>
@@ -11522,7 +11290,7 @@
       </p:sp>
       <p:sp>
         <p:nvSpPr>
-          <p:cNvPr descr="Background pointer shape in timeline graphic" id="278" name="Google Shape;278;p25"/>
+          <p:cNvPr descr="Background pointer shape in timeline graphic" id="269" name="Google Shape;269;p24"/>
           <p:cNvSpPr/>
           <p:nvPr/>
         </p:nvSpPr>
@@ -11573,7 +11341,7 @@
       </p:sp>
       <p:sp>
         <p:nvSpPr>
-          <p:cNvPr id="279" name="Google Shape;279;p25"/>
+          <p:cNvPr id="270" name="Google Shape;270;p24"/>
           <p:cNvSpPr txBox="1"/>
           <p:nvPr>
             <p:ph idx="4294967295" type="body"/>
@@ -11624,7 +11392,7 @@
       </p:sp>
       <p:grpSp>
         <p:nvGrpSpPr>
-          <p:cNvPr id="280" name="Google Shape;280;p25"/>
+          <p:cNvPr id="271" name="Google Shape;271;p24"/>
           <p:cNvGrpSpPr/>
           <p:nvPr/>
         </p:nvGrpSpPr>
@@ -11638,7 +11406,7 @@
         </p:grpSpPr>
         <p:cxnSp>
           <p:nvCxnSpPr>
-            <p:cNvPr id="281" name="Google Shape;281;p25"/>
+            <p:cNvPr id="272" name="Google Shape;272;p24"/>
             <p:cNvCxnSpPr/>
             <p:nvPr/>
           </p:nvCxnSpPr>
@@ -11664,7 +11432,7 @@
         </p:cxnSp>
         <p:sp>
           <p:nvSpPr>
-            <p:cNvPr id="282" name="Google Shape;282;p25"/>
+            <p:cNvPr id="273" name="Google Shape;273;p24"/>
             <p:cNvSpPr/>
             <p:nvPr/>
           </p:nvSpPr>
@@ -11708,7 +11476,7 @@
       </p:grpSp>
       <p:sp>
         <p:nvSpPr>
-          <p:cNvPr id="283" name="Google Shape;283;p25"/>
+          <p:cNvPr id="274" name="Google Shape;274;p24"/>
           <p:cNvSpPr txBox="1"/>
           <p:nvPr>
             <p:ph idx="4294967295" type="body"/>
@@ -11752,7 +11520,7 @@
       </p:sp>
       <p:sp>
         <p:nvSpPr>
-          <p:cNvPr descr="Background pointer shape in timeline graphic" id="284" name="Google Shape;284;p25"/>
+          <p:cNvPr descr="Background pointer shape in timeline graphic" id="275" name="Google Shape;275;p24"/>
           <p:cNvSpPr/>
           <p:nvPr/>
         </p:nvSpPr>
@@ -11803,7 +11571,7 @@
       </p:sp>
       <p:sp>
         <p:nvSpPr>
-          <p:cNvPr id="285" name="Google Shape;285;p25"/>
+          <p:cNvPr id="276" name="Google Shape;276;p24"/>
           <p:cNvSpPr txBox="1"/>
           <p:nvPr>
             <p:ph idx="4294967295" type="body"/>
@@ -11854,7 +11622,7 @@
       </p:sp>
       <p:grpSp>
         <p:nvGrpSpPr>
-          <p:cNvPr id="286" name="Google Shape;286;p25"/>
+          <p:cNvPr id="277" name="Google Shape;277;p24"/>
           <p:cNvGrpSpPr/>
           <p:nvPr/>
         </p:nvGrpSpPr>
@@ -11868,7 +11636,7 @@
         </p:grpSpPr>
         <p:cxnSp>
           <p:nvCxnSpPr>
-            <p:cNvPr id="287" name="Google Shape;287;p25"/>
+            <p:cNvPr id="278" name="Google Shape;278;p24"/>
             <p:cNvCxnSpPr/>
             <p:nvPr/>
           </p:nvCxnSpPr>
@@ -11894,7 +11662,7 @@
         </p:cxnSp>
         <p:sp>
           <p:nvSpPr>
-            <p:cNvPr id="288" name="Google Shape;288;p25"/>
+            <p:cNvPr id="279" name="Google Shape;279;p24"/>
             <p:cNvSpPr/>
             <p:nvPr/>
           </p:nvSpPr>
@@ -11938,7 +11706,7 @@
       </p:grpSp>
       <p:sp>
         <p:nvSpPr>
-          <p:cNvPr id="289" name="Google Shape;289;p25"/>
+          <p:cNvPr id="280" name="Google Shape;280;p24"/>
           <p:cNvSpPr txBox="1"/>
           <p:nvPr>
             <p:ph idx="4294967295" type="body"/>
@@ -11978,7 +11746,7 @@
       </p:sp>
       <p:sp>
         <p:nvSpPr>
-          <p:cNvPr descr="Background pointer shape in timeline graphic" id="290" name="Google Shape;290;p25"/>
+          <p:cNvPr descr="Background pointer shape in timeline graphic" id="281" name="Google Shape;281;p24"/>
           <p:cNvSpPr/>
           <p:nvPr/>
         </p:nvSpPr>
@@ -12029,7 +11797,7 @@
       </p:sp>
       <p:sp>
         <p:nvSpPr>
-          <p:cNvPr id="291" name="Google Shape;291;p25"/>
+          <p:cNvPr id="282" name="Google Shape;282;p24"/>
           <p:cNvSpPr txBox="1"/>
           <p:nvPr>
             <p:ph idx="4294967295" type="body"/>
@@ -12080,7 +11848,7 @@
       </p:sp>
       <p:grpSp>
         <p:nvGrpSpPr>
-          <p:cNvPr id="292" name="Google Shape;292;p25"/>
+          <p:cNvPr id="283" name="Google Shape;283;p24"/>
           <p:cNvGrpSpPr/>
           <p:nvPr/>
         </p:nvGrpSpPr>
@@ -12094,7 +11862,7 @@
         </p:grpSpPr>
         <p:cxnSp>
           <p:nvCxnSpPr>
-            <p:cNvPr id="293" name="Google Shape;293;p25"/>
+            <p:cNvPr id="284" name="Google Shape;284;p24"/>
             <p:cNvCxnSpPr/>
             <p:nvPr/>
           </p:nvCxnSpPr>
@@ -12120,7 +11888,7 @@
         </p:cxnSp>
         <p:sp>
           <p:nvSpPr>
-            <p:cNvPr id="294" name="Google Shape;294;p25"/>
+            <p:cNvPr id="285" name="Google Shape;285;p24"/>
             <p:cNvSpPr/>
             <p:nvPr/>
           </p:nvSpPr>
@@ -12164,7 +11932,7 @@
       </p:grpSp>
       <p:sp>
         <p:nvSpPr>
-          <p:cNvPr id="295" name="Google Shape;295;p25"/>
+          <p:cNvPr id="286" name="Google Shape;286;p24"/>
           <p:cNvSpPr txBox="1"/>
           <p:nvPr>
             <p:ph idx="4294967295" type="body"/>
@@ -12208,7 +11976,7 @@
       </p:sp>
       <p:sp>
         <p:nvSpPr>
-          <p:cNvPr descr="Background pointer shape in timeline graphic" id="296" name="Google Shape;296;p25"/>
+          <p:cNvPr descr="Background pointer shape in timeline graphic" id="287" name="Google Shape;287;p24"/>
           <p:cNvSpPr/>
           <p:nvPr/>
         </p:nvSpPr>
@@ -12259,7 +12027,7 @@
       </p:sp>
       <p:sp>
         <p:nvSpPr>
-          <p:cNvPr id="297" name="Google Shape;297;p25"/>
+          <p:cNvPr id="288" name="Google Shape;288;p24"/>
           <p:cNvSpPr txBox="1"/>
           <p:nvPr>
             <p:ph idx="4294967295" type="body"/>
@@ -12310,7 +12078,7 @@
       </p:sp>
       <p:sp>
         <p:nvSpPr>
-          <p:cNvPr id="298" name="Google Shape;298;p25"/>
+          <p:cNvPr id="289" name="Google Shape;289;p24"/>
           <p:cNvSpPr txBox="1"/>
           <p:nvPr>
             <p:ph idx="4294967295" type="title"/>
@@ -12350,7 +12118,7 @@
       </p:sp>
       <p:sp>
         <p:nvSpPr>
-          <p:cNvPr id="299" name="Google Shape;299;p25"/>
+          <p:cNvPr id="290" name="Google Shape;290;p24"/>
           <p:cNvSpPr txBox="1"/>
           <p:nvPr/>
         </p:nvSpPr>
@@ -12393,7 +12161,7 @@
       </p:sp>
       <p:grpSp>
         <p:nvGrpSpPr>
-          <p:cNvPr id="300" name="Google Shape;300;p25"/>
+          <p:cNvPr id="291" name="Google Shape;291;p24"/>
           <p:cNvGrpSpPr/>
           <p:nvPr/>
         </p:nvGrpSpPr>
@@ -12407,7 +12175,7 @@
         </p:grpSpPr>
         <p:cxnSp>
           <p:nvCxnSpPr>
-            <p:cNvPr id="301" name="Google Shape;301;p25"/>
+            <p:cNvPr id="292" name="Google Shape;292;p24"/>
             <p:cNvCxnSpPr/>
             <p:nvPr/>
           </p:nvCxnSpPr>
@@ -12433,7 +12201,7 @@
         </p:cxnSp>
         <p:sp>
           <p:nvSpPr>
-            <p:cNvPr id="302" name="Google Shape;302;p25"/>
+            <p:cNvPr id="293" name="Google Shape;293;p24"/>
             <p:cNvSpPr/>
             <p:nvPr/>
           </p:nvSpPr>
@@ -12477,7 +12245,7 @@
       </p:grpSp>
       <p:sp>
         <p:nvSpPr>
-          <p:cNvPr id="303" name="Google Shape;303;p25"/>
+          <p:cNvPr id="294" name="Google Shape;294;p24"/>
           <p:cNvSpPr txBox="1"/>
           <p:nvPr>
             <p:ph idx="4294967295" type="body"/>
@@ -12517,7 +12285,7 @@
       </p:sp>
       <p:grpSp>
         <p:nvGrpSpPr>
-          <p:cNvPr id="304" name="Google Shape;304;p25"/>
+          <p:cNvPr id="295" name="Google Shape;295;p24"/>
           <p:cNvGrpSpPr/>
           <p:nvPr/>
         </p:nvGrpSpPr>
@@ -12531,7 +12299,7 @@
         </p:grpSpPr>
         <p:cxnSp>
           <p:nvCxnSpPr>
-            <p:cNvPr id="305" name="Google Shape;305;p25"/>
+            <p:cNvPr id="296" name="Google Shape;296;p24"/>
             <p:cNvCxnSpPr/>
             <p:nvPr/>
           </p:nvCxnSpPr>
@@ -12557,7 +12325,7 @@
         </p:cxnSp>
         <p:sp>
           <p:nvSpPr>
-            <p:cNvPr id="306" name="Google Shape;306;p25"/>
+            <p:cNvPr id="297" name="Google Shape;297;p24"/>
             <p:cNvSpPr/>
             <p:nvPr/>
           </p:nvSpPr>
@@ -12601,7 +12369,7 @@
       </p:grpSp>
       <p:sp>
         <p:nvSpPr>
-          <p:cNvPr id="307" name="Google Shape;307;p25"/>
+          <p:cNvPr id="298" name="Google Shape;298;p24"/>
           <p:cNvSpPr txBox="1"/>
           <p:nvPr>
             <p:ph idx="4294967295" type="body"/>
@@ -12647,12 +12415,12 @@
 </p:sld>
 </file>
 
-<file path=ppt/slides/slide14.xml><?xml version="1.0" encoding="utf-8"?>
+<file path=ppt/slides/slide13.xml><?xml version="1.0" encoding="utf-8"?>
 <p:sld xmlns:a="http://schemas.openxmlformats.org/drawingml/2006/main" xmlns:r="http://schemas.openxmlformats.org/officeDocument/2006/relationships" xmlns:mc="http://schemas.openxmlformats.org/markup-compatibility/2006" xmlns:mv="urn:schemas-microsoft-com:mac:vml" xmlns:p="http://schemas.openxmlformats.org/presentationml/2006/main" xmlns:c="http://schemas.openxmlformats.org/drawingml/2006/chart" xmlns:dgm="http://schemas.openxmlformats.org/drawingml/2006/diagram" xmlns:o="urn:schemas-microsoft-com:office:office" xmlns:v="urn:schemas-microsoft-com:vml" xmlns:pvml="urn:schemas-microsoft-com:office:powerpoint" xmlns:com="http://schemas.openxmlformats.org/drawingml/2006/compatibility" xmlns:p14="http://schemas.microsoft.com/office/powerpoint/2010/main" xmlns:p15="http://schemas.microsoft.com/office/powerpoint/2012/main">
   <p:cSld>
     <p:spTree>
       <p:nvGrpSpPr>
-        <p:cNvPr id="311" name="Shape 311"/>
+        <p:cNvPr id="302" name="Shape 302"/>
         <p:cNvGrpSpPr/>
         <p:nvPr/>
       </p:nvGrpSpPr>
@@ -12666,7 +12434,280 @@
       </p:grpSpPr>
       <p:sp>
         <p:nvSpPr>
-          <p:cNvPr id="312" name="Google Shape;312;p26"/>
+          <p:cNvPr id="303" name="Google Shape;303;p25"/>
+          <p:cNvSpPr/>
+          <p:nvPr/>
+        </p:nvSpPr>
+        <p:spPr>
+          <a:xfrm>
+            <a:off x="-100" y="793275"/>
+            <a:ext cx="9144000" cy="364800"/>
+          </a:xfrm>
+          <a:prstGeom prst="rect">
+            <a:avLst/>
+          </a:prstGeom>
+          <a:gradFill>
+            <a:gsLst>
+              <a:gs pos="0">
+                <a:schemeClr val="accent6"/>
+              </a:gs>
+              <a:gs pos="100000">
+                <a:srgbClr val="FFFFFF"/>
+              </a:gs>
+            </a:gsLst>
+            <a:lin ang="5400012" scaled="0"/>
+          </a:gradFill>
+          <a:ln>
+            <a:noFill/>
+          </a:ln>
+        </p:spPr>
+        <p:txBody>
+          <a:bodyPr anchorCtr="0" anchor="ctr" bIns="91425" lIns="91425" spcFirstLastPara="1" rIns="91425" wrap="square" tIns="91425">
+            <a:noAutofit/>
+          </a:bodyPr>
+          <a:lstStyle/>
+          <a:p>
+            <a:pPr indent="0" lvl="0" marL="0" rtl="0" algn="l">
+              <a:spcBef>
+                <a:spcPts val="0"/>
+              </a:spcBef>
+              <a:spcAft>
+                <a:spcPts val="0"/>
+              </a:spcAft>
+              <a:buNone/>
+            </a:pPr>
+            <a:r>
+              <a:t/>
+            </a:r>
+            <a:endParaRPr/>
+          </a:p>
+        </p:txBody>
+      </p:sp>
+      <p:sp>
+        <p:nvSpPr>
+          <p:cNvPr id="304" name="Google Shape;304;p25"/>
+          <p:cNvSpPr txBox="1"/>
+          <p:nvPr>
+            <p:ph type="title"/>
+          </p:nvPr>
+        </p:nvSpPr>
+        <p:spPr>
+          <a:xfrm>
+            <a:off x="311700" y="181400"/>
+            <a:ext cx="8520600" cy="607800"/>
+          </a:xfrm>
+          <a:prstGeom prst="rect">
+            <a:avLst/>
+          </a:prstGeom>
+        </p:spPr>
+        <p:txBody>
+          <a:bodyPr anchorCtr="0" anchor="t" bIns="91425" lIns="91425" spcFirstLastPara="1" rIns="91425" wrap="square" tIns="91425">
+            <a:noAutofit/>
+          </a:bodyPr>
+          <a:lstStyle/>
+          <a:p>
+            <a:pPr indent="0" lvl="0" marL="0" rtl="0" algn="l">
+              <a:spcBef>
+                <a:spcPts val="0"/>
+              </a:spcBef>
+              <a:spcAft>
+                <a:spcPts val="0"/>
+              </a:spcAft>
+              <a:buNone/>
+            </a:pPr>
+            <a:r>
+              <a:rPr lang="en"/>
+              <a:t>Linear Regression: Ridge Regression</a:t>
+            </a:r>
+            <a:endParaRPr/>
+          </a:p>
+        </p:txBody>
+      </p:sp>
+      <p:pic>
+        <p:nvPicPr>
+          <p:cNvPr id="305" name="Google Shape;305;p25"/>
+          <p:cNvPicPr preferRelativeResize="0"/>
+          <p:nvPr/>
+        </p:nvPicPr>
+        <p:blipFill>
+          <a:blip r:embed="rId3">
+            <a:alphaModFix/>
+          </a:blip>
+          <a:stretch>
+            <a:fillRect/>
+          </a:stretch>
+        </p:blipFill>
+        <p:spPr>
+          <a:xfrm>
+            <a:off x="5620775" y="1543350"/>
+            <a:ext cx="2853125" cy="2961050"/>
+          </a:xfrm>
+          <a:prstGeom prst="rect">
+            <a:avLst/>
+          </a:prstGeom>
+          <a:noFill/>
+          <a:ln>
+            <a:noFill/>
+          </a:ln>
+        </p:spPr>
+      </p:pic>
+      <p:pic>
+        <p:nvPicPr>
+          <p:cNvPr id="306" name="Google Shape;306;p25"/>
+          <p:cNvPicPr preferRelativeResize="0"/>
+          <p:nvPr/>
+        </p:nvPicPr>
+        <p:blipFill>
+          <a:blip r:embed="rId4">
+            <a:alphaModFix/>
+          </a:blip>
+          <a:stretch>
+            <a:fillRect/>
+          </a:stretch>
+        </p:blipFill>
+        <p:spPr>
+          <a:xfrm>
+            <a:off x="1048039" y="1543350"/>
+            <a:ext cx="2349586" cy="2961048"/>
+          </a:xfrm>
+          <a:prstGeom prst="rect">
+            <a:avLst/>
+          </a:prstGeom>
+          <a:noFill/>
+          <a:ln>
+            <a:noFill/>
+          </a:ln>
+        </p:spPr>
+      </p:pic>
+      <p:sp>
+        <p:nvSpPr>
+          <p:cNvPr id="307" name="Google Shape;307;p25"/>
+          <p:cNvSpPr txBox="1"/>
+          <p:nvPr/>
+        </p:nvSpPr>
+        <p:spPr>
+          <a:xfrm>
+            <a:off x="3805350" y="1543350"/>
+            <a:ext cx="1380900" cy="1028400"/>
+          </a:xfrm>
+          <a:prstGeom prst="rect">
+            <a:avLst/>
+          </a:prstGeom>
+          <a:noFill/>
+          <a:ln>
+            <a:noFill/>
+          </a:ln>
+        </p:spPr>
+        <p:txBody>
+          <a:bodyPr anchorCtr="0" anchor="t" bIns="91425" lIns="91425" spcFirstLastPara="1" rIns="91425" wrap="square" tIns="91425">
+            <a:noAutofit/>
+          </a:bodyPr>
+          <a:lstStyle/>
+          <a:p>
+            <a:pPr indent="0" lvl="0" marL="0" rtl="0" algn="ctr">
+              <a:spcBef>
+                <a:spcPts val="0"/>
+              </a:spcBef>
+              <a:spcAft>
+                <a:spcPts val="0"/>
+              </a:spcAft>
+              <a:buNone/>
+            </a:pPr>
+            <a:r>
+              <a:rPr lang="en" sz="3000" u="sng"/>
+              <a:t>Goal</a:t>
+            </a:r>
+            <a:r>
+              <a:rPr lang="en" sz="3000"/>
+              <a:t>: </a:t>
+            </a:r>
+            <a:r>
+              <a:rPr lang="en" sz="1800"/>
+              <a:t>Minimize errors (SSE) and maximize predictive power</a:t>
+            </a:r>
+            <a:endParaRPr sz="1800"/>
+          </a:p>
+        </p:txBody>
+      </p:sp>
+      <p:sp>
+        <p:nvSpPr>
+          <p:cNvPr id="308" name="Google Shape;308;p25"/>
+          <p:cNvSpPr/>
+          <p:nvPr/>
+        </p:nvSpPr>
+        <p:spPr>
+          <a:xfrm rot="10800000">
+            <a:off x="0" y="4778700"/>
+            <a:ext cx="9144000" cy="364800"/>
+          </a:xfrm>
+          <a:prstGeom prst="rect">
+            <a:avLst/>
+          </a:prstGeom>
+          <a:gradFill>
+            <a:gsLst>
+              <a:gs pos="0">
+                <a:schemeClr val="accent6"/>
+              </a:gs>
+              <a:gs pos="100000">
+                <a:srgbClr val="FFFFFF"/>
+              </a:gs>
+            </a:gsLst>
+            <a:lin ang="5400012" scaled="0"/>
+          </a:gradFill>
+          <a:ln>
+            <a:noFill/>
+          </a:ln>
+        </p:spPr>
+        <p:txBody>
+          <a:bodyPr anchorCtr="0" anchor="ctr" bIns="91425" lIns="91425" spcFirstLastPara="1" rIns="91425" wrap="square" tIns="91425">
+            <a:noAutofit/>
+          </a:bodyPr>
+          <a:lstStyle/>
+          <a:p>
+            <a:pPr indent="0" lvl="0" marL="0" rtl="0" algn="l">
+              <a:spcBef>
+                <a:spcPts val="0"/>
+              </a:spcBef>
+              <a:spcAft>
+                <a:spcPts val="0"/>
+              </a:spcAft>
+              <a:buNone/>
+            </a:pPr>
+            <a:r>
+              <a:t/>
+            </a:r>
+            <a:endParaRPr/>
+          </a:p>
+        </p:txBody>
+      </p:sp>
+    </p:spTree>
+  </p:cSld>
+  <p:clrMapOvr>
+    <a:masterClrMapping/>
+  </p:clrMapOvr>
+</p:sld>
+</file>
+
+<file path=ppt/slides/slide14.xml><?xml version="1.0" encoding="utf-8"?>
+<p:sld xmlns:a="http://schemas.openxmlformats.org/drawingml/2006/main" xmlns:r="http://schemas.openxmlformats.org/officeDocument/2006/relationships" xmlns:mc="http://schemas.openxmlformats.org/markup-compatibility/2006" xmlns:mv="urn:schemas-microsoft-com:mac:vml" xmlns:p="http://schemas.openxmlformats.org/presentationml/2006/main" xmlns:c="http://schemas.openxmlformats.org/drawingml/2006/chart" xmlns:dgm="http://schemas.openxmlformats.org/drawingml/2006/diagram" xmlns:o="urn:schemas-microsoft-com:office:office" xmlns:v="urn:schemas-microsoft-com:vml" xmlns:pvml="urn:schemas-microsoft-com:office:powerpoint" xmlns:com="http://schemas.openxmlformats.org/drawingml/2006/compatibility" xmlns:p14="http://schemas.microsoft.com/office/powerpoint/2010/main" xmlns:p15="http://schemas.microsoft.com/office/powerpoint/2012/main">
+  <p:cSld>
+    <p:spTree>
+      <p:nvGrpSpPr>
+        <p:cNvPr id="312" name="Shape 312"/>
+        <p:cNvGrpSpPr/>
+        <p:nvPr/>
+      </p:nvGrpSpPr>
+      <p:grpSpPr>
+        <a:xfrm>
+          <a:off x="0" y="0"/>
+          <a:ext cx="0" cy="0"/>
+          <a:chOff x="0" y="0"/>
+          <a:chExt cx="0" cy="0"/>
+        </a:xfrm>
+      </p:grpSpPr>
+      <p:sp>
+        <p:nvSpPr>
+          <p:cNvPr id="313" name="Google Shape;313;p26"/>
           <p:cNvSpPr txBox="1"/>
           <p:nvPr>
             <p:ph type="title"/>
@@ -12774,7 +12815,7 @@
       </p:sp>
       <p:sp>
         <p:nvSpPr>
-          <p:cNvPr id="313" name="Google Shape;313;p26"/>
+          <p:cNvPr id="314" name="Google Shape;314;p26"/>
           <p:cNvSpPr/>
           <p:nvPr/>
         </p:nvSpPr>
@@ -12837,7 +12878,7 @@
   <p:cSld>
     <p:spTree>
       <p:nvGrpSpPr>
-        <p:cNvPr id="317" name="Shape 317"/>
+        <p:cNvPr id="318" name="Shape 318"/>
         <p:cNvGrpSpPr/>
         <p:nvPr/>
       </p:nvGrpSpPr>
@@ -12851,7 +12892,7 @@
       </p:grpSpPr>
       <p:sp>
         <p:nvSpPr>
-          <p:cNvPr id="318" name="Google Shape;318;p27"/>
+          <p:cNvPr id="319" name="Google Shape;319;p27"/>
           <p:cNvSpPr txBox="1"/>
           <p:nvPr>
             <p:ph type="title"/>
@@ -13025,7 +13066,7 @@
       </p:sp>
       <p:sp>
         <p:nvSpPr>
-          <p:cNvPr id="319" name="Google Shape;319;p27"/>
+          <p:cNvPr id="320" name="Google Shape;320;p27"/>
           <p:cNvSpPr txBox="1"/>
           <p:nvPr>
             <p:ph type="title"/>
@@ -13073,7 +13114,7 @@
       </p:sp>
       <p:pic>
         <p:nvPicPr>
-          <p:cNvPr id="320" name="Google Shape;320;p27"/>
+          <p:cNvPr id="321" name="Google Shape;321;p27"/>
           <p:cNvPicPr preferRelativeResize="0"/>
           <p:nvPr/>
         </p:nvPicPr>
@@ -13112,7 +13153,7 @@
   <p:cSld>
     <p:spTree>
       <p:nvGrpSpPr>
-        <p:cNvPr id="324" name="Shape 324"/>
+        <p:cNvPr id="325" name="Shape 325"/>
         <p:cNvGrpSpPr/>
         <p:nvPr/>
       </p:nvGrpSpPr>
@@ -13126,7 +13167,7 @@
       </p:grpSpPr>
       <p:pic>
         <p:nvPicPr>
-          <p:cNvPr id="325" name="Google Shape;325;p28"/>
+          <p:cNvPr id="326" name="Google Shape;326;p28"/>
           <p:cNvPicPr preferRelativeResize="0"/>
           <p:nvPr/>
         </p:nvPicPr>
@@ -13154,7 +13195,7 @@
       </p:pic>
       <p:sp>
         <p:nvSpPr>
-          <p:cNvPr id="326" name="Google Shape;326;p28"/>
+          <p:cNvPr id="327" name="Google Shape;327;p28"/>
           <p:cNvSpPr txBox="1"/>
           <p:nvPr>
             <p:ph type="title"/>
@@ -13202,7 +13243,7 @@
       </p:sp>
       <p:pic>
         <p:nvPicPr>
-          <p:cNvPr id="327" name="Google Shape;327;p28"/>
+          <p:cNvPr id="328" name="Google Shape;328;p28"/>
           <p:cNvPicPr preferRelativeResize="0"/>
           <p:nvPr/>
         </p:nvPicPr>
@@ -13230,7 +13271,7 @@
       </p:pic>
       <p:sp>
         <p:nvSpPr>
-          <p:cNvPr id="328" name="Google Shape;328;p28"/>
+          <p:cNvPr id="329" name="Google Shape;329;p28"/>
           <p:cNvSpPr txBox="1"/>
           <p:nvPr>
             <p:ph type="title"/>
@@ -13415,7 +13456,7 @@
   <p:cSld>
     <p:spTree>
       <p:nvGrpSpPr>
-        <p:cNvPr id="332" name="Shape 332"/>
+        <p:cNvPr id="333" name="Shape 333"/>
         <p:cNvGrpSpPr/>
         <p:nvPr/>
       </p:nvGrpSpPr>
@@ -13429,7 +13470,7 @@
       </p:grpSpPr>
       <p:sp>
         <p:nvSpPr>
-          <p:cNvPr id="333" name="Google Shape;333;p29"/>
+          <p:cNvPr id="334" name="Google Shape;334;p29"/>
           <p:cNvSpPr txBox="1"/>
           <p:nvPr>
             <p:ph type="title"/>
@@ -13537,7 +13578,7 @@
       </p:sp>
       <p:sp>
         <p:nvSpPr>
-          <p:cNvPr id="334" name="Google Shape;334;p29"/>
+          <p:cNvPr id="335" name="Google Shape;335;p29"/>
           <p:cNvSpPr/>
           <p:nvPr/>
         </p:nvSpPr>
@@ -13600,7 +13641,7 @@
   <p:cSld>
     <p:spTree>
       <p:nvGrpSpPr>
-        <p:cNvPr id="338" name="Shape 338"/>
+        <p:cNvPr id="339" name="Shape 339"/>
         <p:cNvGrpSpPr/>
         <p:nvPr/>
       </p:nvGrpSpPr>
@@ -13614,7 +13655,7 @@
       </p:grpSpPr>
       <p:sp>
         <p:nvSpPr>
-          <p:cNvPr id="339" name="Google Shape;339;p30"/>
+          <p:cNvPr id="340" name="Google Shape;340;p30"/>
           <p:cNvSpPr txBox="1"/>
           <p:nvPr>
             <p:ph type="title"/>
@@ -13654,7 +13695,7 @@
       </p:sp>
       <p:sp>
         <p:nvSpPr>
-          <p:cNvPr id="340" name="Google Shape;340;p30"/>
+          <p:cNvPr id="341" name="Google Shape;341;p30"/>
           <p:cNvSpPr/>
           <p:nvPr/>
         </p:nvSpPr>
@@ -13701,7 +13742,7 @@
       </p:sp>
       <p:sp>
         <p:nvSpPr>
-          <p:cNvPr id="341" name="Google Shape;341;p30"/>
+          <p:cNvPr id="342" name="Google Shape;342;p30"/>
           <p:cNvSpPr txBox="1"/>
           <p:nvPr>
             <p:ph idx="4294967295" type="body"/>
@@ -13749,7 +13790,7 @@
       </p:sp>
       <p:sp>
         <p:nvSpPr>
-          <p:cNvPr id="342" name="Google Shape;342;p30"/>
+          <p:cNvPr id="343" name="Google Shape;343;p30"/>
           <p:cNvSpPr txBox="1"/>
           <p:nvPr>
             <p:ph idx="4294967295" type="body"/>
@@ -13881,7 +13922,7 @@
       </p:sp>
       <p:sp>
         <p:nvSpPr>
-          <p:cNvPr id="343" name="Google Shape;343;p30"/>
+          <p:cNvPr id="344" name="Google Shape;344;p30"/>
           <p:cNvSpPr txBox="1"/>
           <p:nvPr/>
         </p:nvSpPr>
@@ -13924,7 +13965,7 @@
       </p:sp>
       <p:sp>
         <p:nvSpPr>
-          <p:cNvPr id="344" name="Google Shape;344;p30"/>
+          <p:cNvPr id="345" name="Google Shape;345;p30"/>
           <p:cNvSpPr txBox="1"/>
           <p:nvPr>
             <p:ph idx="4294967295" type="body"/>

</xml_diff>